<commit_message>
Rename SQL database name
Also update docs.
Also change github action on push to deploy to staging server rather
than production server.

Signed-off-by: Dave Thaler <dthaler1968@gmail.com>
</commit_message>
<xml_diff>
--- a/docs/OrcanodeMonitorArchitecture.pptx
+++ b/docs/OrcanodeMonitorArchitecture.pptx
@@ -104,6 +104,11 @@
       </a:defRPr>
     </a:lvl9pPr>
   </p:defaultTextStyle>
+  <p:extLst>
+    <p:ext uri="{EFAFB233-063F-42B5-8137-9DF3F51BA10A}">
+      <p15:sldGuideLst xmlns:p15="http://schemas.microsoft.com/office/powerpoint/2012/main"/>
+    </p:ext>
+  </p:extLst>
 </p:presentation>
 </file>
 
@@ -254,7 +259,7 @@
           <a:p>
             <a:fld id="{88A15B7B-FC50-4B62-A641-953A64DFFA9A}" type="datetimeFigureOut">
               <a:rPr lang="en-US" smtClean="0"/>
-              <a:t>6/4/2024</a:t>
+              <a:t>6/9/2024</a:t>
             </a:fld>
             <a:endParaRPr lang="en-US"/>
           </a:p>
@@ -452,7 +457,7 @@
           <a:p>
             <a:fld id="{88A15B7B-FC50-4B62-A641-953A64DFFA9A}" type="datetimeFigureOut">
               <a:rPr lang="en-US" smtClean="0"/>
-              <a:t>6/4/2024</a:t>
+              <a:t>6/9/2024</a:t>
             </a:fld>
             <a:endParaRPr lang="en-US"/>
           </a:p>
@@ -660,7 +665,7 @@
           <a:p>
             <a:fld id="{88A15B7B-FC50-4B62-A641-953A64DFFA9A}" type="datetimeFigureOut">
               <a:rPr lang="en-US" smtClean="0"/>
-              <a:t>6/4/2024</a:t>
+              <a:t>6/9/2024</a:t>
             </a:fld>
             <a:endParaRPr lang="en-US"/>
           </a:p>
@@ -858,7 +863,7 @@
           <a:p>
             <a:fld id="{88A15B7B-FC50-4B62-A641-953A64DFFA9A}" type="datetimeFigureOut">
               <a:rPr lang="en-US" smtClean="0"/>
-              <a:t>6/4/2024</a:t>
+              <a:t>6/9/2024</a:t>
             </a:fld>
             <a:endParaRPr lang="en-US"/>
           </a:p>
@@ -1133,7 +1138,7 @@
           <a:p>
             <a:fld id="{88A15B7B-FC50-4B62-A641-953A64DFFA9A}" type="datetimeFigureOut">
               <a:rPr lang="en-US" smtClean="0"/>
-              <a:t>6/4/2024</a:t>
+              <a:t>6/9/2024</a:t>
             </a:fld>
             <a:endParaRPr lang="en-US"/>
           </a:p>
@@ -1398,7 +1403,7 @@
           <a:p>
             <a:fld id="{88A15B7B-FC50-4B62-A641-953A64DFFA9A}" type="datetimeFigureOut">
               <a:rPr lang="en-US" smtClean="0"/>
-              <a:t>6/4/2024</a:t>
+              <a:t>6/9/2024</a:t>
             </a:fld>
             <a:endParaRPr lang="en-US"/>
           </a:p>
@@ -1810,7 +1815,7 @@
           <a:p>
             <a:fld id="{88A15B7B-FC50-4B62-A641-953A64DFFA9A}" type="datetimeFigureOut">
               <a:rPr lang="en-US" smtClean="0"/>
-              <a:t>6/4/2024</a:t>
+              <a:t>6/9/2024</a:t>
             </a:fld>
             <a:endParaRPr lang="en-US"/>
           </a:p>
@@ -1951,7 +1956,7 @@
           <a:p>
             <a:fld id="{88A15B7B-FC50-4B62-A641-953A64DFFA9A}" type="datetimeFigureOut">
               <a:rPr lang="en-US" smtClean="0"/>
-              <a:t>6/4/2024</a:t>
+              <a:t>6/9/2024</a:t>
             </a:fld>
             <a:endParaRPr lang="en-US"/>
           </a:p>
@@ -2064,7 +2069,7 @@
           <a:p>
             <a:fld id="{88A15B7B-FC50-4B62-A641-953A64DFFA9A}" type="datetimeFigureOut">
               <a:rPr lang="en-US" smtClean="0"/>
-              <a:t>6/4/2024</a:t>
+              <a:t>6/9/2024</a:t>
             </a:fld>
             <a:endParaRPr lang="en-US"/>
           </a:p>
@@ -2375,7 +2380,7 @@
           <a:p>
             <a:fld id="{88A15B7B-FC50-4B62-A641-953A64DFFA9A}" type="datetimeFigureOut">
               <a:rPr lang="en-US" smtClean="0"/>
-              <a:t>6/4/2024</a:t>
+              <a:t>6/9/2024</a:t>
             </a:fld>
             <a:endParaRPr lang="en-US"/>
           </a:p>
@@ -2663,7 +2668,7 @@
           <a:p>
             <a:fld id="{88A15B7B-FC50-4B62-A641-953A64DFFA9A}" type="datetimeFigureOut">
               <a:rPr lang="en-US" smtClean="0"/>
-              <a:t>6/4/2024</a:t>
+              <a:t>6/9/2024</a:t>
             </a:fld>
             <a:endParaRPr lang="en-US"/>
           </a:p>
@@ -2904,7 +2909,7 @@
           <a:p>
             <a:fld id="{88A15B7B-FC50-4B62-A641-953A64DFFA9A}" type="datetimeFigureOut">
               <a:rPr lang="en-US" smtClean="0"/>
-              <a:t>6/4/2024</a:t>
+              <a:t>6/9/2024</a:t>
             </a:fld>
             <a:endParaRPr lang="en-US"/>
           </a:p>
@@ -3392,7 +3397,7 @@
         <p:spPr>
           <a:xfrm>
             <a:off x="3900424" y="1951736"/>
-            <a:ext cx="1372616" cy="914400"/>
+            <a:ext cx="1275248" cy="914400"/>
           </a:xfrm>
           <a:prstGeom prst="rect">
             <a:avLst/>
@@ -3882,8 +3887,8 @@
         </p:nvSpPr>
         <p:spPr>
           <a:xfrm>
-            <a:off x="5941422" y="2000424"/>
-            <a:ext cx="833120" cy="447040"/>
+            <a:off x="5843092" y="2000424"/>
+            <a:ext cx="1152679" cy="596336"/>
           </a:xfrm>
           <a:prstGeom prst="can">
             <a:avLst/>
@@ -3912,7 +3917,7 @@
             <a:pPr algn="ctr"/>
             <a:r>
               <a:rPr lang="en-US" dirty="0"/>
-              <a:t>State</a:t>
+              <a:t>SQL database</a:t>
             </a:r>
           </a:p>
         </p:txBody>
@@ -3984,8 +3989,8 @@
         </p:nvCxnSpPr>
         <p:spPr>
           <a:xfrm flipV="1">
-            <a:off x="5273040" y="2223944"/>
-            <a:ext cx="668382" cy="184992"/>
+            <a:off x="5175672" y="2298592"/>
+            <a:ext cx="667420" cy="110344"/>
           </a:xfrm>
           <a:prstGeom prst="straightConnector1">
             <a:avLst/>
@@ -4027,8 +4032,8 @@
         </p:nvCxnSpPr>
         <p:spPr>
           <a:xfrm flipV="1">
-            <a:off x="6252974" y="2447464"/>
-            <a:ext cx="105008" cy="418672"/>
+            <a:off x="6252974" y="2596760"/>
+            <a:ext cx="166458" cy="269376"/>
           </a:xfrm>
           <a:prstGeom prst="straightConnector1">
             <a:avLst/>
@@ -4066,7 +4071,7 @@
         </p:nvSpPr>
         <p:spPr>
           <a:xfrm rot="20379870">
-            <a:off x="5268546" y="1952494"/>
+            <a:off x="5241114" y="1952494"/>
             <a:ext cx="678840" cy="369332"/>
           </a:xfrm>
           <a:prstGeom prst="rect">
@@ -4136,8 +4141,8 @@
         </p:nvSpPr>
         <p:spPr>
           <a:xfrm>
-            <a:off x="7225409" y="2052235"/>
-            <a:ext cx="1372616" cy="627068"/>
+            <a:off x="7478079" y="2052235"/>
+            <a:ext cx="1119945" cy="627068"/>
           </a:xfrm>
           <a:prstGeom prst="rect">
             <a:avLst/>
@@ -4185,7 +4190,7 @@
         </p:nvSpPr>
         <p:spPr>
           <a:xfrm>
-            <a:off x="6655357" y="2328315"/>
+            <a:off x="6920533" y="2328315"/>
             <a:ext cx="633571" cy="369332"/>
           </a:xfrm>
           <a:prstGeom prst="rect">
@@ -4224,8 +4229,8 @@
         </p:nvCxnSpPr>
         <p:spPr>
           <a:xfrm flipH="1" flipV="1">
-            <a:off x="6774542" y="2223944"/>
-            <a:ext cx="450867" cy="141825"/>
+            <a:off x="6995771" y="2298592"/>
+            <a:ext cx="482308" cy="67177"/>
           </a:xfrm>
           <a:prstGeom prst="straightConnector1">
             <a:avLst/>
@@ -4323,8 +4328,8 @@
         </p:nvCxnSpPr>
         <p:spPr>
           <a:xfrm flipH="1">
-            <a:off x="8598025" y="2328315"/>
-            <a:ext cx="1170309" cy="37454"/>
+            <a:off x="8598024" y="2328315"/>
+            <a:ext cx="1170310" cy="37454"/>
           </a:xfrm>
           <a:prstGeom prst="straightConnector1">
             <a:avLst/>
@@ -4349,41 +4354,6 @@
           </a:fontRef>
         </p:style>
       </p:cxnSp>
-      <p:sp>
-        <p:nvSpPr>
-          <p:cNvPr id="50" name="TextBox 49">
-            <a:extLst>
-              <a:ext uri="{FF2B5EF4-FFF2-40B4-BE49-F238E27FC236}">
-                <a16:creationId xmlns:a16="http://schemas.microsoft.com/office/drawing/2014/main" id="{5129C912-1B79-1ECC-716B-C5438131B4E0}"/>
-              </a:ext>
-            </a:extLst>
-          </p:cNvPr>
-          <p:cNvSpPr txBox="1"/>
-          <p:nvPr/>
-        </p:nvSpPr>
-        <p:spPr>
-          <a:xfrm rot="21438461">
-            <a:off x="8942455" y="1981505"/>
-            <a:ext cx="722057" cy="369332"/>
-          </a:xfrm>
-          <a:prstGeom prst="rect">
-            <a:avLst/>
-          </a:prstGeom>
-          <a:noFill/>
-        </p:spPr>
-        <p:txBody>
-          <a:bodyPr wrap="none" rtlCol="0">
-            <a:spAutoFit/>
-          </a:bodyPr>
-          <a:lstStyle/>
-          <a:p>
-            <a:r>
-              <a:rPr lang="en-US" dirty="0"/>
-              <a:t>POST</a:t>
-            </a:r>
-          </a:p>
-        </p:txBody>
-      </p:sp>
       <p:sp>
         <p:nvSpPr>
           <p:cNvPr id="53" name="Rectangle 52">
@@ -4458,8 +4428,8 @@
         </p:nvCxnSpPr>
         <p:spPr>
           <a:xfrm>
-            <a:off x="8598025" y="2365769"/>
-            <a:ext cx="1170309" cy="710929"/>
+            <a:off x="8598024" y="2365769"/>
+            <a:ext cx="1170310" cy="710929"/>
           </a:xfrm>
           <a:prstGeom prst="straightConnector1">
             <a:avLst/>
@@ -4755,6 +4725,48 @@
             <a:r>
               <a:rPr lang="en-US" sz="2400" b="1" dirty="0"/>
               <a:t> Monitor Architecture – June 2024</a:t>
+            </a:r>
+          </a:p>
+        </p:txBody>
+      </p:sp>
+      <p:sp>
+        <p:nvSpPr>
+          <p:cNvPr id="34" name="TextBox 33">
+            <a:extLst>
+              <a:ext uri="{FF2B5EF4-FFF2-40B4-BE49-F238E27FC236}">
+                <a16:creationId xmlns:a16="http://schemas.microsoft.com/office/drawing/2014/main" id="{99B38BF7-89DA-C7AD-BA5C-E2A0CCB36904}"/>
+              </a:ext>
+            </a:extLst>
+          </p:cNvPr>
+          <p:cNvSpPr txBox="1"/>
+          <p:nvPr/>
+        </p:nvSpPr>
+        <p:spPr>
+          <a:xfrm>
+            <a:off x="8874916" y="2038539"/>
+            <a:ext cx="915700" cy="646331"/>
+          </a:xfrm>
+          <a:prstGeom prst="rect">
+            <a:avLst/>
+          </a:prstGeom>
+          <a:noFill/>
+        </p:spPr>
+        <p:txBody>
+          <a:bodyPr wrap="none" rtlCol="0">
+            <a:spAutoFit/>
+          </a:bodyPr>
+          <a:lstStyle/>
+          <a:p>
+            <a:r>
+              <a:rPr lang="en-US" dirty="0"/>
+              <a:t>POST</a:t>
+            </a:r>
+          </a:p>
+          <a:p>
+            <a:pPr algn="ctr"/>
+            <a:r>
+              <a:rPr lang="en-US" dirty="0"/>
+              <a:t>(future)</a:t>
             </a:r>
           </a:p>
         </p:txBody>

</xml_diff>

<commit_message>
Rename SQL database name (#34)
Also update docs.
Also change github action on push to deploy to staging server rather
than production server.

Signed-off-by: Dave Thaler <dthaler1968@gmail.com>
</commit_message>
<xml_diff>
--- a/docs/OrcanodeMonitorArchitecture.pptx
+++ b/docs/OrcanodeMonitorArchitecture.pptx
@@ -104,6 +104,11 @@
       </a:defRPr>
     </a:lvl9pPr>
   </p:defaultTextStyle>
+  <p:extLst>
+    <p:ext uri="{EFAFB233-063F-42B5-8137-9DF3F51BA10A}">
+      <p15:sldGuideLst xmlns:p15="http://schemas.microsoft.com/office/powerpoint/2012/main"/>
+    </p:ext>
+  </p:extLst>
 </p:presentation>
 </file>
 
@@ -254,7 +259,7 @@
           <a:p>
             <a:fld id="{88A15B7B-FC50-4B62-A641-953A64DFFA9A}" type="datetimeFigureOut">
               <a:rPr lang="en-US" smtClean="0"/>
-              <a:t>6/4/2024</a:t>
+              <a:t>6/9/2024</a:t>
             </a:fld>
             <a:endParaRPr lang="en-US"/>
           </a:p>
@@ -452,7 +457,7 @@
           <a:p>
             <a:fld id="{88A15B7B-FC50-4B62-A641-953A64DFFA9A}" type="datetimeFigureOut">
               <a:rPr lang="en-US" smtClean="0"/>
-              <a:t>6/4/2024</a:t>
+              <a:t>6/9/2024</a:t>
             </a:fld>
             <a:endParaRPr lang="en-US"/>
           </a:p>
@@ -660,7 +665,7 @@
           <a:p>
             <a:fld id="{88A15B7B-FC50-4B62-A641-953A64DFFA9A}" type="datetimeFigureOut">
               <a:rPr lang="en-US" smtClean="0"/>
-              <a:t>6/4/2024</a:t>
+              <a:t>6/9/2024</a:t>
             </a:fld>
             <a:endParaRPr lang="en-US"/>
           </a:p>
@@ -858,7 +863,7 @@
           <a:p>
             <a:fld id="{88A15B7B-FC50-4B62-A641-953A64DFFA9A}" type="datetimeFigureOut">
               <a:rPr lang="en-US" smtClean="0"/>
-              <a:t>6/4/2024</a:t>
+              <a:t>6/9/2024</a:t>
             </a:fld>
             <a:endParaRPr lang="en-US"/>
           </a:p>
@@ -1133,7 +1138,7 @@
           <a:p>
             <a:fld id="{88A15B7B-FC50-4B62-A641-953A64DFFA9A}" type="datetimeFigureOut">
               <a:rPr lang="en-US" smtClean="0"/>
-              <a:t>6/4/2024</a:t>
+              <a:t>6/9/2024</a:t>
             </a:fld>
             <a:endParaRPr lang="en-US"/>
           </a:p>
@@ -1398,7 +1403,7 @@
           <a:p>
             <a:fld id="{88A15B7B-FC50-4B62-A641-953A64DFFA9A}" type="datetimeFigureOut">
               <a:rPr lang="en-US" smtClean="0"/>
-              <a:t>6/4/2024</a:t>
+              <a:t>6/9/2024</a:t>
             </a:fld>
             <a:endParaRPr lang="en-US"/>
           </a:p>
@@ -1810,7 +1815,7 @@
           <a:p>
             <a:fld id="{88A15B7B-FC50-4B62-A641-953A64DFFA9A}" type="datetimeFigureOut">
               <a:rPr lang="en-US" smtClean="0"/>
-              <a:t>6/4/2024</a:t>
+              <a:t>6/9/2024</a:t>
             </a:fld>
             <a:endParaRPr lang="en-US"/>
           </a:p>
@@ -1951,7 +1956,7 @@
           <a:p>
             <a:fld id="{88A15B7B-FC50-4B62-A641-953A64DFFA9A}" type="datetimeFigureOut">
               <a:rPr lang="en-US" smtClean="0"/>
-              <a:t>6/4/2024</a:t>
+              <a:t>6/9/2024</a:t>
             </a:fld>
             <a:endParaRPr lang="en-US"/>
           </a:p>
@@ -2064,7 +2069,7 @@
           <a:p>
             <a:fld id="{88A15B7B-FC50-4B62-A641-953A64DFFA9A}" type="datetimeFigureOut">
               <a:rPr lang="en-US" smtClean="0"/>
-              <a:t>6/4/2024</a:t>
+              <a:t>6/9/2024</a:t>
             </a:fld>
             <a:endParaRPr lang="en-US"/>
           </a:p>
@@ -2375,7 +2380,7 @@
           <a:p>
             <a:fld id="{88A15B7B-FC50-4B62-A641-953A64DFFA9A}" type="datetimeFigureOut">
               <a:rPr lang="en-US" smtClean="0"/>
-              <a:t>6/4/2024</a:t>
+              <a:t>6/9/2024</a:t>
             </a:fld>
             <a:endParaRPr lang="en-US"/>
           </a:p>
@@ -2663,7 +2668,7 @@
           <a:p>
             <a:fld id="{88A15B7B-FC50-4B62-A641-953A64DFFA9A}" type="datetimeFigureOut">
               <a:rPr lang="en-US" smtClean="0"/>
-              <a:t>6/4/2024</a:t>
+              <a:t>6/9/2024</a:t>
             </a:fld>
             <a:endParaRPr lang="en-US"/>
           </a:p>
@@ -2904,7 +2909,7 @@
           <a:p>
             <a:fld id="{88A15B7B-FC50-4B62-A641-953A64DFFA9A}" type="datetimeFigureOut">
               <a:rPr lang="en-US" smtClean="0"/>
-              <a:t>6/4/2024</a:t>
+              <a:t>6/9/2024</a:t>
             </a:fld>
             <a:endParaRPr lang="en-US"/>
           </a:p>
@@ -3392,7 +3397,7 @@
         <p:spPr>
           <a:xfrm>
             <a:off x="3900424" y="1951736"/>
-            <a:ext cx="1372616" cy="914400"/>
+            <a:ext cx="1275248" cy="914400"/>
           </a:xfrm>
           <a:prstGeom prst="rect">
             <a:avLst/>
@@ -3882,8 +3887,8 @@
         </p:nvSpPr>
         <p:spPr>
           <a:xfrm>
-            <a:off x="5941422" y="2000424"/>
-            <a:ext cx="833120" cy="447040"/>
+            <a:off x="5843092" y="2000424"/>
+            <a:ext cx="1152679" cy="596336"/>
           </a:xfrm>
           <a:prstGeom prst="can">
             <a:avLst/>
@@ -3912,7 +3917,7 @@
             <a:pPr algn="ctr"/>
             <a:r>
               <a:rPr lang="en-US" dirty="0"/>
-              <a:t>State</a:t>
+              <a:t>SQL database</a:t>
             </a:r>
           </a:p>
         </p:txBody>
@@ -3984,8 +3989,8 @@
         </p:nvCxnSpPr>
         <p:spPr>
           <a:xfrm flipV="1">
-            <a:off x="5273040" y="2223944"/>
-            <a:ext cx="668382" cy="184992"/>
+            <a:off x="5175672" y="2298592"/>
+            <a:ext cx="667420" cy="110344"/>
           </a:xfrm>
           <a:prstGeom prst="straightConnector1">
             <a:avLst/>
@@ -4027,8 +4032,8 @@
         </p:nvCxnSpPr>
         <p:spPr>
           <a:xfrm flipV="1">
-            <a:off x="6252974" y="2447464"/>
-            <a:ext cx="105008" cy="418672"/>
+            <a:off x="6252974" y="2596760"/>
+            <a:ext cx="166458" cy="269376"/>
           </a:xfrm>
           <a:prstGeom prst="straightConnector1">
             <a:avLst/>
@@ -4066,7 +4071,7 @@
         </p:nvSpPr>
         <p:spPr>
           <a:xfrm rot="20379870">
-            <a:off x="5268546" y="1952494"/>
+            <a:off x="5241114" y="1952494"/>
             <a:ext cx="678840" cy="369332"/>
           </a:xfrm>
           <a:prstGeom prst="rect">
@@ -4136,8 +4141,8 @@
         </p:nvSpPr>
         <p:spPr>
           <a:xfrm>
-            <a:off x="7225409" y="2052235"/>
-            <a:ext cx="1372616" cy="627068"/>
+            <a:off x="7478079" y="2052235"/>
+            <a:ext cx="1119945" cy="627068"/>
           </a:xfrm>
           <a:prstGeom prst="rect">
             <a:avLst/>
@@ -4185,7 +4190,7 @@
         </p:nvSpPr>
         <p:spPr>
           <a:xfrm>
-            <a:off x="6655357" y="2328315"/>
+            <a:off x="6920533" y="2328315"/>
             <a:ext cx="633571" cy="369332"/>
           </a:xfrm>
           <a:prstGeom prst="rect">
@@ -4224,8 +4229,8 @@
         </p:nvCxnSpPr>
         <p:spPr>
           <a:xfrm flipH="1" flipV="1">
-            <a:off x="6774542" y="2223944"/>
-            <a:ext cx="450867" cy="141825"/>
+            <a:off x="6995771" y="2298592"/>
+            <a:ext cx="482308" cy="67177"/>
           </a:xfrm>
           <a:prstGeom prst="straightConnector1">
             <a:avLst/>
@@ -4323,8 +4328,8 @@
         </p:nvCxnSpPr>
         <p:spPr>
           <a:xfrm flipH="1">
-            <a:off x="8598025" y="2328315"/>
-            <a:ext cx="1170309" cy="37454"/>
+            <a:off x="8598024" y="2328315"/>
+            <a:ext cx="1170310" cy="37454"/>
           </a:xfrm>
           <a:prstGeom prst="straightConnector1">
             <a:avLst/>
@@ -4349,41 +4354,6 @@
           </a:fontRef>
         </p:style>
       </p:cxnSp>
-      <p:sp>
-        <p:nvSpPr>
-          <p:cNvPr id="50" name="TextBox 49">
-            <a:extLst>
-              <a:ext uri="{FF2B5EF4-FFF2-40B4-BE49-F238E27FC236}">
-                <a16:creationId xmlns:a16="http://schemas.microsoft.com/office/drawing/2014/main" id="{5129C912-1B79-1ECC-716B-C5438131B4E0}"/>
-              </a:ext>
-            </a:extLst>
-          </p:cNvPr>
-          <p:cNvSpPr txBox="1"/>
-          <p:nvPr/>
-        </p:nvSpPr>
-        <p:spPr>
-          <a:xfrm rot="21438461">
-            <a:off x="8942455" y="1981505"/>
-            <a:ext cx="722057" cy="369332"/>
-          </a:xfrm>
-          <a:prstGeom prst="rect">
-            <a:avLst/>
-          </a:prstGeom>
-          <a:noFill/>
-        </p:spPr>
-        <p:txBody>
-          <a:bodyPr wrap="none" rtlCol="0">
-            <a:spAutoFit/>
-          </a:bodyPr>
-          <a:lstStyle/>
-          <a:p>
-            <a:r>
-              <a:rPr lang="en-US" dirty="0"/>
-              <a:t>POST</a:t>
-            </a:r>
-          </a:p>
-        </p:txBody>
-      </p:sp>
       <p:sp>
         <p:nvSpPr>
           <p:cNvPr id="53" name="Rectangle 52">
@@ -4458,8 +4428,8 @@
         </p:nvCxnSpPr>
         <p:spPr>
           <a:xfrm>
-            <a:off x="8598025" y="2365769"/>
-            <a:ext cx="1170309" cy="710929"/>
+            <a:off x="8598024" y="2365769"/>
+            <a:ext cx="1170310" cy="710929"/>
           </a:xfrm>
           <a:prstGeom prst="straightConnector1">
             <a:avLst/>
@@ -4755,6 +4725,48 @@
             <a:r>
               <a:rPr lang="en-US" sz="2400" b="1" dirty="0"/>
               <a:t> Monitor Architecture – June 2024</a:t>
+            </a:r>
+          </a:p>
+        </p:txBody>
+      </p:sp>
+      <p:sp>
+        <p:nvSpPr>
+          <p:cNvPr id="34" name="TextBox 33">
+            <a:extLst>
+              <a:ext uri="{FF2B5EF4-FFF2-40B4-BE49-F238E27FC236}">
+                <a16:creationId xmlns:a16="http://schemas.microsoft.com/office/drawing/2014/main" id="{99B38BF7-89DA-C7AD-BA5C-E2A0CCB36904}"/>
+              </a:ext>
+            </a:extLst>
+          </p:cNvPr>
+          <p:cNvSpPr txBox="1"/>
+          <p:nvPr/>
+        </p:nvSpPr>
+        <p:spPr>
+          <a:xfrm>
+            <a:off x="8874916" y="2038539"/>
+            <a:ext cx="915700" cy="646331"/>
+          </a:xfrm>
+          <a:prstGeom prst="rect">
+            <a:avLst/>
+          </a:prstGeom>
+          <a:noFill/>
+        </p:spPr>
+        <p:txBody>
+          <a:bodyPr wrap="none" rtlCol="0">
+            <a:spAutoFit/>
+          </a:bodyPr>
+          <a:lstStyle/>
+          <a:p>
+            <a:r>
+              <a:rPr lang="en-US" dirty="0"/>
+              <a:t>POST</a:t>
+            </a:r>
+          </a:p>
+          <a:p>
+            <a:pPr algn="ctr"/>
+            <a:r>
+              <a:rPr lang="en-US" dirty="0"/>
+              <a:t>(future)</a:t>
             </a:r>
           </a:p>
         </p:txBody>

</xml_diff>